<commit_message>
presentation is updated and text is added
</commit_message>
<xml_diff>
--- a/docs/diploma.pptx
+++ b/docs/diploma.pptx
@@ -200,7 +200,8 @@
           <a:p>
             <a:fld id="{FB89E5D2-1426-4D1F-8754-F8FF6058023F}" type="datetimeFigureOut">
               <a:rPr lang="en-US" smtClean="0"/>
-              <a:t>5/22/2012</a:t>
+              <a:pPr/>
+              <a:t>6/6/2012</a:t>
             </a:fld>
             <a:endParaRPr lang="en-US"/>
           </a:p>
@@ -266,6 +267,7 @@
           <a:p>
             <a:fld id="{6F812B4D-4E60-4B0B-872C-250BFDB900D5}" type="slidenum">
               <a:rPr lang="en-US" smtClean="0"/>
+              <a:pPr/>
               <a:t>‹#›</a:t>
             </a:fld>
             <a:endParaRPr lang="en-US"/>
@@ -460,7 +462,7 @@
             <a:fld id="{C561F99B-DEDC-4780-99C9-30424E62093C}" type="datetimeFigureOut">
               <a:rPr lang="en-US" smtClean="0"/>
               <a:pPr/>
-              <a:t>5/22/2012</a:t>
+              <a:t>6/6/2012</a:t>
             </a:fld>
             <a:endParaRPr lang="en-US"/>
           </a:p>
@@ -627,7 +629,7 @@
             <a:fld id="{C561F99B-DEDC-4780-99C9-30424E62093C}" type="datetimeFigureOut">
               <a:rPr lang="en-US" smtClean="0"/>
               <a:pPr/>
-              <a:t>5/22/2012</a:t>
+              <a:t>6/6/2012</a:t>
             </a:fld>
             <a:endParaRPr lang="en-US"/>
           </a:p>
@@ -804,7 +806,7 @@
             <a:fld id="{C561F99B-DEDC-4780-99C9-30424E62093C}" type="datetimeFigureOut">
               <a:rPr lang="en-US" smtClean="0"/>
               <a:pPr/>
-              <a:t>5/22/2012</a:t>
+              <a:t>6/6/2012</a:t>
             </a:fld>
             <a:endParaRPr lang="en-US"/>
           </a:p>
@@ -971,7 +973,7 @@
             <a:fld id="{C561F99B-DEDC-4780-99C9-30424E62093C}" type="datetimeFigureOut">
               <a:rPr lang="en-US" smtClean="0"/>
               <a:pPr/>
-              <a:t>5/22/2012</a:t>
+              <a:t>6/6/2012</a:t>
             </a:fld>
             <a:endParaRPr lang="en-US"/>
           </a:p>
@@ -1214,7 +1216,7 @@
             <a:fld id="{C561F99B-DEDC-4780-99C9-30424E62093C}" type="datetimeFigureOut">
               <a:rPr lang="en-US" smtClean="0"/>
               <a:pPr/>
-              <a:t>5/22/2012</a:t>
+              <a:t>6/6/2012</a:t>
             </a:fld>
             <a:endParaRPr lang="en-US"/>
           </a:p>
@@ -1499,7 +1501,7 @@
             <a:fld id="{C561F99B-DEDC-4780-99C9-30424E62093C}" type="datetimeFigureOut">
               <a:rPr lang="en-US" smtClean="0"/>
               <a:pPr/>
-              <a:t>5/22/2012</a:t>
+              <a:t>6/6/2012</a:t>
             </a:fld>
             <a:endParaRPr lang="en-US"/>
           </a:p>
@@ -1918,7 +1920,7 @@
             <a:fld id="{C561F99B-DEDC-4780-99C9-30424E62093C}" type="datetimeFigureOut">
               <a:rPr lang="en-US" smtClean="0"/>
               <a:pPr/>
-              <a:t>5/22/2012</a:t>
+              <a:t>6/6/2012</a:t>
             </a:fld>
             <a:endParaRPr lang="en-US"/>
           </a:p>
@@ -2033,7 +2035,7 @@
             <a:fld id="{C561F99B-DEDC-4780-99C9-30424E62093C}" type="datetimeFigureOut">
               <a:rPr lang="en-US" smtClean="0"/>
               <a:pPr/>
-              <a:t>5/22/2012</a:t>
+              <a:t>6/6/2012</a:t>
             </a:fld>
             <a:endParaRPr lang="en-US"/>
           </a:p>
@@ -2125,7 +2127,7 @@
             <a:fld id="{C561F99B-DEDC-4780-99C9-30424E62093C}" type="datetimeFigureOut">
               <a:rPr lang="en-US" smtClean="0"/>
               <a:pPr/>
-              <a:t>5/22/2012</a:t>
+              <a:t>6/6/2012</a:t>
             </a:fld>
             <a:endParaRPr lang="en-US"/>
           </a:p>
@@ -2399,7 +2401,7 @@
             <a:fld id="{C561F99B-DEDC-4780-99C9-30424E62093C}" type="datetimeFigureOut">
               <a:rPr lang="en-US" smtClean="0"/>
               <a:pPr/>
-              <a:t>5/22/2012</a:t>
+              <a:t>6/6/2012</a:t>
             </a:fld>
             <a:endParaRPr lang="en-US"/>
           </a:p>
@@ -2649,7 +2651,7 @@
             <a:fld id="{C561F99B-DEDC-4780-99C9-30424E62093C}" type="datetimeFigureOut">
               <a:rPr lang="en-US" smtClean="0"/>
               <a:pPr/>
-              <a:t>5/22/2012</a:t>
+              <a:t>6/6/2012</a:t>
             </a:fld>
             <a:endParaRPr lang="en-US"/>
           </a:p>
@@ -2859,7 +2861,7 @@
             <a:fld id="{C561F99B-DEDC-4780-99C9-30424E62093C}" type="datetimeFigureOut">
               <a:rPr lang="en-US" smtClean="0"/>
               <a:pPr/>
-              <a:t>5/22/2012</a:t>
+              <a:t>6/6/2012</a:t>
             </a:fld>
             <a:endParaRPr lang="en-US"/>
           </a:p>
@@ -3399,43 +3401,44 @@
             </a:r>
             <a:r>
               <a:rPr lang="en-US" b="1" dirty="0" smtClean="0"/>
-              <a:t>: ? ?</a:t>
+              <a:t>: </a:t>
+            </a:r>
+            <a:r>
+              <a:rPr lang="ru-RU" b="1" dirty="0" smtClean="0"/>
+              <a:t>Шалымов</a:t>
+            </a:r>
+            <a:r>
+              <a:rPr lang="en-US" b="1" dirty="0" smtClean="0"/>
+              <a:t> </a:t>
+            </a:r>
+            <a:r>
+              <a:rPr lang="ru-RU" b="1" dirty="0" smtClean="0"/>
+              <a:t>Д</a:t>
             </a:r>
             <a:r>
               <a:rPr lang="ru-RU" b="1" dirty="0" smtClean="0"/>
               <a:t>. </a:t>
             </a:r>
             <a:r>
-              <a:rPr lang="en-US" b="1" dirty="0" smtClean="0"/>
-              <a:t>?</a:t>
+              <a:rPr lang="ru-RU" b="1" dirty="0" smtClean="0"/>
+              <a:t>С</a:t>
             </a:r>
             <a:r>
               <a:rPr lang="ru-RU" b="1" dirty="0" smtClean="0"/>
               <a:t>.</a:t>
             </a:r>
-          </a:p>
-          <a:p>
-            <a:r>
-              <a:rPr lang="en-US" dirty="0" smtClean="0"/>
-              <a:t>?</a:t>
-            </a:r>
-            <a:r>
-              <a:rPr lang="ru-RU" dirty="0" smtClean="0"/>
-              <a:t>, </a:t>
-            </a:r>
-            <a:r>
-              <a:rPr lang="en-US" dirty="0" smtClean="0"/>
-              <a:t>?</a:t>
-            </a:r>
-            <a:r>
-              <a:rPr lang="ru-RU" dirty="0" smtClean="0"/>
-              <a:t>, </a:t>
-            </a:r>
-            <a:r>
-              <a:rPr lang="en-US" dirty="0" smtClean="0"/>
-              <a:t>?</a:t>
-            </a:r>
-            <a:endParaRPr lang="en-US" dirty="0"/>
+            <a:endParaRPr lang="ru-RU" b="1" dirty="0" smtClean="0"/>
+          </a:p>
+          <a:p>
+            <a:r>
+              <a:rPr lang="ru-RU" dirty="0" smtClean="0"/>
+              <a:t>Доцент, математико-механический факультет, </a:t>
+            </a:r>
+            <a:r>
+              <a:rPr lang="ru-RU" dirty="0" smtClean="0"/>
+              <a:t>СПбГУ</a:t>
+            </a:r>
+            <a:endParaRPr lang="en-US" dirty="0" smtClean="0"/>
           </a:p>
         </p:txBody>
       </p:sp>
@@ -3511,8 +3514,9 @@
           <a:p>
             <a:r>
               <a:rPr lang="ru-RU" dirty="0" smtClean="0"/>
-              <a:t>Микроблоги, как источник данных</a:t>
-            </a:r>
+              <a:t>Микроблоги как источник данных</a:t>
+            </a:r>
+            <a:endParaRPr lang="ru-RU" dirty="0" smtClean="0"/>
           </a:p>
           <a:p>
             <a:pPr lvl="1"/>
@@ -3537,6 +3541,46 @@
               <a:rPr lang="ru-RU" dirty="0" smtClean="0"/>
               <a:t>записей</a:t>
             </a:r>
+          </a:p>
+          <a:p>
+            <a:pPr lvl="1"/>
+            <a:r>
+              <a:rPr lang="ru-RU" dirty="0" smtClean="0"/>
+              <a:t>По тематике</a:t>
+            </a:r>
+          </a:p>
+          <a:p>
+            <a:pPr lvl="1"/>
+            <a:r>
+              <a:rPr lang="ru-RU" dirty="0" smtClean="0"/>
+              <a:t>Спам</a:t>
+            </a:r>
+            <a:r>
+              <a:rPr lang="en-US" dirty="0" smtClean="0"/>
+              <a:t>/</a:t>
+            </a:r>
+            <a:r>
+              <a:rPr lang="ru-RU" dirty="0" smtClean="0"/>
+              <a:t>не спам</a:t>
+            </a:r>
+          </a:p>
+          <a:p>
+            <a:pPr lvl="1"/>
+            <a:r>
+              <a:rPr lang="ru-RU" dirty="0" smtClean="0"/>
+              <a:t>Содержательные</a:t>
+            </a:r>
+            <a:r>
+              <a:rPr lang="en-US" dirty="0" smtClean="0"/>
+              <a:t>/</a:t>
+            </a:r>
+            <a:r>
+              <a:rPr lang="ru-RU" dirty="0" smtClean="0"/>
+              <a:t>не содержательные</a:t>
+            </a:r>
+          </a:p>
+          <a:p>
+            <a:pPr lvl="1"/>
             <a:endParaRPr lang="ru-RU" dirty="0" smtClean="0"/>
           </a:p>
         </p:txBody>
@@ -3613,7 +3657,15 @@
           <a:p>
             <a:r>
               <a:rPr lang="ru-RU" dirty="0" smtClean="0"/>
-              <a:t>Построить классификатор сообщений из микроблогов</a:t>
+              <a:t>Построить классификатор </a:t>
+            </a:r>
+            <a:r>
+              <a:rPr lang="ru-RU" dirty="0" smtClean="0"/>
+              <a:t>записей из </a:t>
+            </a:r>
+            <a:r>
+              <a:rPr lang="ru-RU" dirty="0" smtClean="0"/>
+              <a:t>микроблогов</a:t>
             </a:r>
           </a:p>
           <a:p>
@@ -3626,25 +3678,15 @@
             <a:pPr lvl="1"/>
             <a:r>
               <a:rPr lang="ru-RU" dirty="0" smtClean="0"/>
-              <a:t>В</a:t>
-            </a:r>
-            <a:r>
-              <a:rPr lang="ru-RU" dirty="0" smtClean="0"/>
-              <a:t>икипедию</a:t>
-            </a:r>
-            <a:endParaRPr lang="ru-RU" dirty="0" smtClean="0"/>
+              <a:t>Википедию</a:t>
+            </a:r>
           </a:p>
           <a:p>
             <a:pPr lvl="1"/>
             <a:r>
               <a:rPr lang="ru-RU" dirty="0" smtClean="0"/>
-              <a:t>К</a:t>
-            </a:r>
-            <a:r>
-              <a:rPr lang="ru-RU" dirty="0" smtClean="0"/>
-              <a:t>онтекст</a:t>
-            </a:r>
-            <a:endParaRPr lang="ru-RU" dirty="0" smtClean="0"/>
+              <a:t>Контекст</a:t>
+            </a:r>
           </a:p>
           <a:p>
             <a:pPr lvl="1"/>
@@ -3717,15 +3759,15 @@
           <a:p>
             <a:r>
               <a:rPr lang="ru-RU" dirty="0" smtClean="0"/>
-              <a:t>Использование других </a:t>
-            </a:r>
-            <a:r>
-              <a:rPr lang="ru-RU" dirty="0" smtClean="0"/>
-              <a:t>записей </a:t>
-            </a:r>
-            <a:r>
-              <a:rPr lang="ru-RU" dirty="0" smtClean="0"/>
-              <a:t>автора, как контекст для классификации</a:t>
+              <a:t>Использование других записей </a:t>
+            </a:r>
+            <a:r>
+              <a:rPr lang="ru-RU" dirty="0" smtClean="0"/>
+              <a:t>автора </a:t>
+            </a:r>
+            <a:r>
+              <a:rPr lang="ru-RU" dirty="0" smtClean="0"/>
+              <a:t>как контекст для классификации</a:t>
             </a:r>
           </a:p>
           <a:p>
@@ -3828,22 +3870,13 @@
           <a:p>
             <a:r>
               <a:rPr lang="ru-RU" dirty="0" smtClean="0"/>
-              <a:t>Алгоритмы классификации требуют </a:t>
-            </a:r>
-            <a:r>
-              <a:rPr lang="ru-RU" dirty="0" smtClean="0"/>
-              <a:t>векторов</a:t>
-            </a:r>
-            <a:endParaRPr lang="ru-RU" dirty="0" smtClean="0"/>
-          </a:p>
-          <a:p>
-            <a:r>
-              <a:rPr lang="ru-RU" dirty="0" smtClean="0"/>
-              <a:t>Использовать Википедию для преобразования текста в </a:t>
-            </a:r>
-            <a:r>
-              <a:rPr lang="ru-RU" dirty="0" smtClean="0"/>
-              <a:t>вектора</a:t>
+              <a:t>Алгоритмы классификации требуют векторов</a:t>
+            </a:r>
+          </a:p>
+          <a:p>
+            <a:r>
+              <a:rPr lang="ru-RU" dirty="0" smtClean="0"/>
+              <a:t>Использовать Википедию для преобразования текста в вектора</a:t>
             </a:r>
           </a:p>
           <a:p>
@@ -3851,27 +3884,13 @@
               <a:rPr lang="ru-RU" dirty="0" smtClean="0"/>
               <a:t>Алгоритм</a:t>
             </a:r>
-            <a:endParaRPr lang="ru-RU" dirty="0" smtClean="0"/>
           </a:p>
           <a:p>
             <a:pPr lvl="1"/>
             <a:r>
               <a:rPr lang="ru-RU" dirty="0" smtClean="0"/>
-              <a:t>Нахождение </a:t>
-            </a:r>
-            <a:r>
-              <a:rPr lang="ru-RU" dirty="0" smtClean="0"/>
-              <a:t>релевантных тексту </a:t>
-            </a:r>
-            <a:r>
-              <a:rPr lang="ru-RU" dirty="0" smtClean="0"/>
-              <a:t>страниц </a:t>
-            </a:r>
-            <a:r>
-              <a:rPr lang="ru-RU" dirty="0" smtClean="0"/>
-              <a:t>в Википедии</a:t>
-            </a:r>
-            <a:endParaRPr lang="ru-RU" dirty="0" smtClean="0"/>
+              <a:t>Нахождение релевантных тексту страниц в Википедии</a:t>
+            </a:r>
           </a:p>
           <a:p>
             <a:pPr lvl="1"/>
@@ -3962,7 +3981,11 @@
           <a:p>
             <a:r>
               <a:rPr lang="ru-RU" dirty="0" smtClean="0"/>
-              <a:t>Тестовые данные</a:t>
+              <a:t>Размеченные тестовые </a:t>
+            </a:r>
+            <a:r>
+              <a:rPr lang="ru-RU" dirty="0" smtClean="0"/>
+              <a:t>данные</a:t>
             </a:r>
           </a:p>
           <a:p>
@@ -4030,13 +4053,8 @@
           <a:p>
             <a:r>
               <a:rPr lang="ru-RU" dirty="0" smtClean="0"/>
-              <a:t>Оценка </a:t>
-            </a:r>
-            <a:r>
-              <a:rPr lang="ru-RU" dirty="0" smtClean="0"/>
-              <a:t>результатов</a:t>
-            </a:r>
-            <a:endParaRPr lang="ru-RU" dirty="0" smtClean="0"/>
+              <a:t>Оценка результатов</a:t>
+            </a:r>
           </a:p>
           <a:p>
             <a:pPr lvl="1"/>
@@ -4327,7 +4345,7 @@
         <p:spPr/>
         <p:txBody>
           <a:bodyPr>
-            <a:normAutofit fontScale="92500" lnSpcReduction="10000"/>
+            <a:normAutofit fontScale="92500" lnSpcReduction="20000"/>
           </a:bodyPr>
           <a:lstStyle/>
           <a:p>
@@ -4339,19 +4357,7 @@
           <a:p>
             <a:r>
               <a:rPr lang="ru-RU" dirty="0" smtClean="0"/>
-              <a:t>Наилучшие </a:t>
-            </a:r>
-            <a:r>
-              <a:rPr lang="ru-RU" dirty="0" smtClean="0"/>
-              <a:t>результаты </a:t>
-            </a:r>
-            <a:r>
-              <a:rPr lang="ru-RU" dirty="0" smtClean="0"/>
-              <a:t>показал </a:t>
-            </a:r>
-            <a:r>
-              <a:rPr lang="ru-RU" dirty="0" smtClean="0"/>
-              <a:t>алгоритм </a:t>
+              <a:t>Наилучшие результаты показал алгоритм </a:t>
             </a:r>
             <a:r>
               <a:rPr lang="en-US" dirty="0" smtClean="0"/>
@@ -4408,15 +4414,7 @@
           <a:p>
             <a:r>
               <a:rPr lang="ru-RU" dirty="0" smtClean="0"/>
-              <a:t>Наиболее </a:t>
-            </a:r>
-            <a:r>
-              <a:rPr lang="ru-RU" dirty="0" smtClean="0"/>
-              <a:t>подходящим </a:t>
-            </a:r>
-            <a:r>
-              <a:rPr lang="ru-RU" dirty="0" smtClean="0"/>
-              <a:t>алгоритмом кластеризации является </a:t>
+              <a:t>Наиболее подходящим алгоритмом кластеризации является </a:t>
             </a:r>
             <a:r>
               <a:rPr lang="en-US" dirty="0" err="1" smtClean="0"/>
@@ -4427,24 +4425,17 @@
           <a:p>
             <a:r>
               <a:rPr lang="ru-RU" dirty="0" smtClean="0"/>
-              <a:t>Наименьшее </a:t>
-            </a:r>
-            <a:r>
-              <a:rPr lang="ru-RU" dirty="0" smtClean="0"/>
-              <a:t>улучшение </a:t>
-            </a:r>
-            <a:r>
-              <a:rPr lang="ru-RU" dirty="0" smtClean="0"/>
-              <a:t>- </a:t>
-            </a:r>
-            <a:r>
-              <a:rPr lang="en-US" dirty="0" smtClean="0"/>
-              <a:t>J48</a:t>
+              <a:t>Наименьшее улучшение </a:t>
+            </a:r>
+            <a:r>
+              <a:rPr lang="ru-RU" dirty="0" smtClean="0"/>
+              <a:t>– наивный байесовский алгоритм</a:t>
             </a:r>
             <a:r>
               <a:rPr lang="en-US" dirty="0" smtClean="0"/>
               <a:t>.</a:t>
             </a:r>
+            <a:endParaRPr lang="en-US" dirty="0" smtClean="0"/>
           </a:p>
           <a:p>
             <a:endParaRPr lang="ru-RU" dirty="0" smtClean="0"/>
@@ -4520,17 +4511,8 @@
           <a:p>
             <a:r>
               <a:rPr lang="ru-RU" dirty="0" smtClean="0"/>
-              <a:t>Создан алгоритм классификации записей из </a:t>
-            </a:r>
-            <a:r>
-              <a:rPr lang="ru-RU" dirty="0" smtClean="0"/>
-              <a:t>м</a:t>
-            </a:r>
-            <a:r>
-              <a:rPr lang="ru-RU" dirty="0" smtClean="0"/>
-              <a:t>икроблогов</a:t>
-            </a:r>
-            <a:endParaRPr lang="ru-RU" dirty="0" smtClean="0"/>
+              <a:t>Создан алгоритм классификации записей из микроблогов</a:t>
+            </a:r>
           </a:p>
           <a:p>
             <a:pPr lvl="1"/>
@@ -4543,7 +4525,27 @@
             <a:pPr lvl="1"/>
             <a:r>
               <a:rPr lang="ru-RU" dirty="0" smtClean="0"/>
-              <a:t>Использующий Википедию, как источник дополнительных  данных</a:t>
+              <a:t>Использующий </a:t>
+            </a:r>
+            <a:r>
+              <a:rPr lang="ru-RU" dirty="0" smtClean="0"/>
+              <a:t>«</a:t>
+            </a:r>
+            <a:r>
+              <a:rPr lang="ru-RU" dirty="0" smtClean="0"/>
+              <a:t>Википедию</a:t>
+            </a:r>
+            <a:r>
+              <a:rPr lang="ru-RU" dirty="0" smtClean="0"/>
+              <a:t>»</a:t>
+            </a:r>
+            <a:r>
+              <a:rPr lang="ru-RU" dirty="0" smtClean="0"/>
+              <a:t>, </a:t>
+            </a:r>
+            <a:r>
+              <a:rPr lang="ru-RU" dirty="0" smtClean="0"/>
+              <a:t>как источник дополнительных  данных</a:t>
             </a:r>
           </a:p>
           <a:p>

</xml_diff>